<commit_message>
Added the git urls
</commit_message>
<xml_diff>
--- a/Intro/intro.pptx
+++ b/Intro/intro.pptx
@@ -15,7 +15,7 @@
     <p:sldId id="288" r:id="rId3"/>
     <p:sldId id="290" r:id="rId4"/>
     <p:sldId id="292" r:id="rId5"/>
-    <p:sldId id="293" r:id="rId6"/>
+    <p:sldId id="297" r:id="rId6"/>
     <p:sldId id="294" r:id="rId7"/>
     <p:sldId id="296" r:id="rId8"/>
   </p:sldIdLst>
@@ -260,7 +260,7 @@
             <a:fld id="{11263177-940D-4B97-A051-92805C7C3152}" type="datetimeFigureOut">
               <a:rPr lang="en-US" smtClean="0"/>
               <a:pPr/>
-              <a:t>9/6/16</a:t>
+              <a:t>9/8/16</a:t>
             </a:fld>
             <a:endParaRPr lang="en-US"/>
           </a:p>
@@ -427,7 +427,7 @@
             <a:fld id="{F138B54E-4A02-452E-ADC8-FC4AE631CF37}" type="datetimeFigureOut">
               <a:rPr lang="en-US" smtClean="0"/>
               <a:pPr/>
-              <a:t>9/6/16</a:t>
+              <a:t>9/8/16</a:t>
             </a:fld>
             <a:endParaRPr lang="en-US"/>
           </a:p>
@@ -1100,7 +1100,7 @@
     </p:spTree>
     <p:extLst>
       <p:ext uri="{BB962C8B-B14F-4D97-AF65-F5344CB8AC3E}">
-        <p14:creationId xmlns:p14="http://schemas.microsoft.com/office/powerpoint/2010/main" val="349954336"/>
+        <p14:creationId xmlns:p14="http://schemas.microsoft.com/office/powerpoint/2010/main" val="1004133627"/>
       </p:ext>
     </p:extLst>
   </p:cSld>
@@ -9106,11 +9106,6 @@
               </a:rPr>
               <a:t>Ruud Puts &amp; Stefan Renne</a:t>
             </a:r>
-            <a:endParaRPr lang="nl-NL" dirty="0" smtClean="0">
-              <a:solidFill>
-                <a:srgbClr val="353535"/>
-              </a:solidFill>
-            </a:endParaRPr>
           </a:p>
           <a:p>
             <a:pPr>
@@ -9567,7 +9562,6 @@
               <a:rPr lang="nl-NL" dirty="0" smtClean="0"/>
               <a:t> </a:t>
             </a:r>
-            <a:endParaRPr lang="nl-NL" dirty="0" smtClean="0"/>
           </a:p>
           <a:p>
             <a:pPr marL="342900" lvl="1" indent="-342900">
@@ -9696,7 +9690,6 @@
               <a:rPr lang="nl-NL" sz="1500" b="0" dirty="0" smtClean="0"/>
               <a:t>Server Side, Linux, PS4, Windows, Android</a:t>
             </a:r>
-            <a:endParaRPr lang="nl-NL" sz="1500" b="0" dirty="0" smtClean="0"/>
           </a:p>
           <a:p>
             <a:pPr marL="342900" indent="-342900">
@@ -9910,14 +9903,135 @@
         </p:blipFill>
         <p:spPr>
           <a:xfrm>
-            <a:off x="3365500" y="1229532"/>
-            <a:ext cx="2413000" cy="3009900"/>
+            <a:off x="4528539" y="2271085"/>
+            <a:ext cx="1549222" cy="1932451"/>
           </a:xfrm>
           <a:prstGeom prst="rect">
             <a:avLst/>
           </a:prstGeom>
         </p:spPr>
       </p:pic>
+      <p:sp>
+        <p:nvSpPr>
+          <p:cNvPr id="3" name="TextBox 2"/>
+          <p:cNvSpPr txBox="1"/>
+          <p:nvPr/>
+        </p:nvSpPr>
+        <p:spPr>
+          <a:xfrm>
+            <a:off x="342000" y="1419195"/>
+            <a:ext cx="8460000" cy="461395"/>
+          </a:xfrm>
+          <a:prstGeom prst="rect">
+            <a:avLst/>
+          </a:prstGeom>
+          <a:noFill/>
+        </p:spPr>
+        <p:txBody>
+          <a:bodyPr wrap="none" lIns="36000" tIns="36000" rIns="36000" bIns="36000" rtlCol="0">
+            <a:noAutofit/>
+          </a:bodyPr>
+          <a:lstStyle/>
+          <a:p>
+            <a:pPr>
+              <a:lnSpc>
+                <a:spcPts val="2400"/>
+              </a:lnSpc>
+            </a:pPr>
+            <a:r>
+              <a:rPr lang="en-US" dirty="0"/>
+              <a:t>https://</a:t>
+            </a:r>
+            <a:r>
+              <a:rPr lang="en-US" dirty="0" err="1"/>
+              <a:t>github.com</a:t>
+            </a:r>
+            <a:r>
+              <a:rPr lang="en-US" dirty="0"/>
+              <a:t>/</a:t>
+            </a:r>
+            <a:r>
+              <a:rPr lang="en-US" dirty="0" err="1"/>
+              <a:t>stefanrenne</a:t>
+            </a:r>
+            <a:r>
+              <a:rPr lang="en-US" dirty="0"/>
+              <a:t>/</a:t>
+            </a:r>
+            <a:r>
+              <a:rPr lang="en-US" dirty="0" err="1"/>
+              <a:t>swiftBootcamp</a:t>
+            </a:r>
+            <a:endParaRPr lang="en-US" dirty="0" smtClean="0"/>
+          </a:p>
+        </p:txBody>
+      </p:sp>
+      <p:pic>
+        <p:nvPicPr>
+          <p:cNvPr id="4" name="Picture 3"/>
+          <p:cNvPicPr>
+            <a:picLocks noChangeAspect="1"/>
+          </p:cNvPicPr>
+          <p:nvPr/>
+        </p:nvPicPr>
+        <p:blipFill>
+          <a:blip r:embed="rId4">
+            <a:extLst>
+              <a:ext uri="{28A0092B-C50C-407E-A947-70E740481C1C}">
+                <a14:useLocalDpi xmlns:a14="http://schemas.microsoft.com/office/drawing/2010/main" val="0"/>
+              </a:ext>
+            </a:extLst>
+          </a:blip>
+          <a:stretch>
+            <a:fillRect/>
+          </a:stretch>
+        </p:blipFill>
+        <p:spPr>
+          <a:xfrm>
+            <a:off x="1884624" y="2532461"/>
+            <a:ext cx="1498600" cy="1409700"/>
+          </a:xfrm>
+          <a:prstGeom prst="rect">
+            <a:avLst/>
+          </a:prstGeom>
+        </p:spPr>
+      </p:pic>
+      <p:cxnSp>
+        <p:nvCxnSpPr>
+          <p:cNvPr id="7" name="Straight Arrow Connector 6"/>
+          <p:cNvCxnSpPr/>
+          <p:nvPr/>
+        </p:nvCxnSpPr>
+        <p:spPr>
+          <a:xfrm>
+            <a:off x="3383224" y="3081590"/>
+            <a:ext cx="989901" cy="0"/>
+          </a:xfrm>
+          <a:prstGeom prst="straightConnector1">
+            <a:avLst/>
+          </a:prstGeom>
+          <a:ln w="28575">
+            <a:solidFill>
+              <a:srgbClr val="00B0F0"/>
+            </a:solidFill>
+            <a:tailEnd type="triangle"/>
+          </a:ln>
+        </p:spPr>
+        <p:style>
+          <a:lnRef idx="1">
+            <a:schemeClr val="accent1"/>
+          </a:lnRef>
+          <a:fillRef idx="0">
+            <a:schemeClr val="accent1"/>
+          </a:fillRef>
+          <a:effectRef idx="0">
+            <a:schemeClr val="accent1"/>
+          </a:effectRef>
+          <a:fontRef idx="minor">
+            <a:schemeClr val="tx1"/>
+          </a:fontRef>
+        </p:style>
+      </p:cxnSp>
     </p:spTree>
     <p:extLst>
       <p:ext uri="{BB962C8B-B14F-4D97-AF65-F5344CB8AC3E}">
@@ -9971,11 +10085,11 @@
           <a:lstStyle/>
           <a:p>
             <a:r>
+              <a:rPr lang="nl-NL" dirty="0" smtClean="0"/>
+              <a:t>Casus</a:t>
+            </a:r>
+            <a:r>
               <a:rPr lang="nl-NL" dirty="0"/>
-              <a:t>Casus</a:t>
-            </a:r>
-            <a:r>
-              <a:rPr lang="nl-NL" dirty="0" smtClean="0"/>
               <a:t>.</a:t>
             </a:r>
             <a:endParaRPr lang="nl-NL" dirty="0"/>
@@ -10037,9 +10151,100 @@
           </a:p>
         </p:txBody>
       </p:sp>
+      <p:sp>
+        <p:nvSpPr>
+          <p:cNvPr id="3" name="TextBox 2"/>
+          <p:cNvSpPr txBox="1"/>
+          <p:nvPr/>
+        </p:nvSpPr>
+        <p:spPr>
+          <a:xfrm>
+            <a:off x="342000" y="1419195"/>
+            <a:ext cx="8460000" cy="461395"/>
+          </a:xfrm>
+          <a:prstGeom prst="rect">
+            <a:avLst/>
+          </a:prstGeom>
+          <a:noFill/>
+        </p:spPr>
+        <p:txBody>
+          <a:bodyPr wrap="none" lIns="36000" tIns="36000" rIns="36000" bIns="36000" rtlCol="0">
+            <a:noAutofit/>
+          </a:bodyPr>
+          <a:lstStyle/>
+          <a:p>
+            <a:pPr>
+              <a:lnSpc>
+                <a:spcPts val="2400"/>
+              </a:lnSpc>
+            </a:pPr>
+            <a:r>
+              <a:rPr lang="en-US" dirty="0"/>
+              <a:t>https://</a:t>
+            </a:r>
+            <a:r>
+              <a:rPr lang="en-US" dirty="0" err="1"/>
+              <a:t>github.com</a:t>
+            </a:r>
+            <a:r>
+              <a:rPr lang="en-US" dirty="0"/>
+              <a:t>/</a:t>
+            </a:r>
+            <a:r>
+              <a:rPr lang="en-US" dirty="0" err="1"/>
+              <a:t>stefanrenne</a:t>
+            </a:r>
+            <a:r>
+              <a:rPr lang="en-US" dirty="0"/>
+              <a:t>/</a:t>
+            </a:r>
+            <a:r>
+              <a:rPr lang="en-US" dirty="0" err="1"/>
+              <a:t>swiftBootcamp</a:t>
+            </a:r>
+            <a:endParaRPr lang="en-US" dirty="0" smtClean="0"/>
+          </a:p>
+        </p:txBody>
+      </p:sp>
+      <p:cxnSp>
+        <p:nvCxnSpPr>
+          <p:cNvPr id="7" name="Straight Arrow Connector 6"/>
+          <p:cNvCxnSpPr/>
+          <p:nvPr/>
+        </p:nvCxnSpPr>
+        <p:spPr>
+          <a:xfrm>
+            <a:off x="3383224" y="3081590"/>
+            <a:ext cx="989901" cy="0"/>
+          </a:xfrm>
+          <a:prstGeom prst="straightConnector1">
+            <a:avLst/>
+          </a:prstGeom>
+          <a:ln w="28575">
+            <a:solidFill>
+              <a:srgbClr val="00B0F0"/>
+            </a:solidFill>
+            <a:tailEnd type="triangle"/>
+          </a:ln>
+        </p:spPr>
+        <p:style>
+          <a:lnRef idx="1">
+            <a:schemeClr val="accent1"/>
+          </a:lnRef>
+          <a:fillRef idx="0">
+            <a:schemeClr val="accent1"/>
+          </a:fillRef>
+          <a:effectRef idx="0">
+            <a:schemeClr val="accent1"/>
+          </a:effectRef>
+          <a:fontRef idx="minor">
+            <a:schemeClr val="tx1"/>
+          </a:fontRef>
+        </p:style>
+      </p:cxnSp>
       <p:pic>
         <p:nvPicPr>
-          <p:cNvPr id="5" name="Picture 4"/>
+          <p:cNvPr id="12" name="Picture 11"/>
           <p:cNvPicPr>
             <a:picLocks noChangeAspect="1"/>
           </p:cNvPicPr>
@@ -10059,8 +10264,38 @@
         </p:blipFill>
         <p:spPr>
           <a:xfrm>
-            <a:off x="3282950" y="1345163"/>
-            <a:ext cx="2578100" cy="2946400"/>
+            <a:off x="4572000" y="2270480"/>
+            <a:ext cx="1661175" cy="1898486"/>
+          </a:xfrm>
+          <a:prstGeom prst="rect">
+            <a:avLst/>
+          </a:prstGeom>
+        </p:spPr>
+      </p:pic>
+      <p:pic>
+        <p:nvPicPr>
+          <p:cNvPr id="13" name="Picture 12"/>
+          <p:cNvPicPr>
+            <a:picLocks noChangeAspect="1"/>
+          </p:cNvPicPr>
+          <p:nvPr/>
+        </p:nvPicPr>
+        <p:blipFill>
+          <a:blip r:embed="rId4">
+            <a:extLst>
+              <a:ext uri="{28A0092B-C50C-407E-A947-70E740481C1C}">
+                <a14:useLocalDpi xmlns:a14="http://schemas.microsoft.com/office/drawing/2010/main" val="0"/>
+              </a:ext>
+            </a:extLst>
+          </a:blip>
+          <a:stretch>
+            <a:fillRect/>
+          </a:stretch>
+        </p:blipFill>
+        <p:spPr>
+          <a:xfrm>
+            <a:off x="2037024" y="2555136"/>
+            <a:ext cx="1346200" cy="1409700"/>
           </a:xfrm>
           <a:prstGeom prst="rect">
             <a:avLst/>
@@ -10070,7 +10305,7 @@
     </p:spTree>
     <p:extLst>
       <p:ext uri="{BB962C8B-B14F-4D97-AF65-F5344CB8AC3E}">
-        <p14:creationId xmlns:p14="http://schemas.microsoft.com/office/powerpoint/2010/main" val="1503911018"/>
+        <p14:creationId xmlns:p14="http://schemas.microsoft.com/office/powerpoint/2010/main" val="1214671487"/>
       </p:ext>
     </p:extLst>
   </p:cSld>

</xml_diff>